<commit_message>
Commit ER - FINAL E APP
</commit_message>
<xml_diff>
--- a/ApresentacaoProjetoBD.pptx
+++ b/ApresentacaoProjetoBD.pptx
@@ -7,6 +7,10 @@
   <p:sldIdLst>
     <p:sldId id="256" r:id="rId2"/>
     <p:sldId id="257" r:id="rId3"/>
+    <p:sldId id="259" r:id="rId4"/>
+    <p:sldId id="258" r:id="rId5"/>
+    <p:sldId id="260" r:id="rId6"/>
+    <p:sldId id="261" r:id="rId7"/>
   </p:sldIdLst>
   <p:sldSz cx="12192000" cy="6858000"/>
   <p:notesSz cx="6858000" cy="9144000"/>
@@ -106,6 +110,18 @@
     </a:lvl9pPr>
   </p:defaultTextStyle>
 </p:presentation>
+</file>
+
+<file path=ppt/commentAuthors.xml><?xml version="1.0" encoding="utf-8"?>
+<p:cmAuthorLst xmlns:a="http://schemas.openxmlformats.org/drawingml/2006/main" xmlns:r="http://schemas.openxmlformats.org/officeDocument/2006/relationships" xmlns:p="http://schemas.openxmlformats.org/presentationml/2006/main">
+  <p:cmAuthor id="1" name=" " initials="" lastIdx="1" clrIdx="0">
+    <p:extLst>
+      <p:ext uri="{19B8F6BF-5375-455C-9EA6-DF929625EA0E}">
+        <p15:presenceInfo xmlns:p15="http://schemas.microsoft.com/office/powerpoint/2012/main" userId="14adee51745036aa" providerId="Windows Live"/>
+      </p:ext>
+    </p:extLst>
+  </p:cmAuthor>
+</p:cmAuthorLst>
 </file>
 
 <file path=ppt/slideLayouts/slideLayout1.xml><?xml version="1.0" encoding="utf-8"?>
@@ -3345,7 +3361,7 @@
           <a:p>
             <a:r>
               <a:rPr lang="pt-PT" dirty="0"/>
-              <a:t>**Titulo do projeto**(?)</a:t>
+              <a:t>Projeto Base de Dados 20/21</a:t>
             </a:r>
           </a:p>
         </p:txBody>
@@ -3453,7 +3469,7 @@
           <a:p>
             <a:r>
               <a:rPr lang="pt-PT" dirty="0"/>
-              <a:t>Resumo</a:t>
+              <a:t>Resumo do Projeto</a:t>
             </a:r>
           </a:p>
         </p:txBody>
@@ -3482,14 +3498,30 @@
           <a:lstStyle/>
           <a:p>
             <a:r>
-              <a:rPr lang="pt-PT" sz="1800" dirty="0"/>
-              <a:t>Este projeto consiste no desenvolvimento de um sistema típico de leilão, suportado por um sistema de gestão de base </a:t>
-            </a:r>
-            <a:r>
-              <a:rPr lang="pt-PT" sz="1800"/>
-              <a:t>de dados.</a:t>
-            </a:r>
-            <a:endParaRPr lang="pt-PT" sz="1800" dirty="0"/>
+              <a:rPr lang="pt-PT" sz="2000" dirty="0"/>
+              <a:t>Este projeto consiste no desenvolvimento de um sistema típico de leilão, suportado por um sistema de gestão de base de dados.</a:t>
+            </a:r>
+          </a:p>
+          <a:p>
+            <a:r>
+              <a:rPr lang="pt-PT" sz="2000" dirty="0"/>
+              <a:t>A base de dados irá conter informações, como os leilões que existiram e que estão a decorrer, o artigo a ser vendido no leilão, o criador do leilão (vendedor), as licitações efetuadas pelos compradores.</a:t>
+            </a:r>
+          </a:p>
+          <a:p>
+            <a:r>
+              <a:rPr lang="pt-PT" sz="2000" dirty="0"/>
+              <a:t>Tanto os vendedores como os compradores são apenas utilizadores da aplicação. No entanto, um vendedor não pode licitar no seu próprio leilão. Será mantida uma listagem com os artigos que cada utilizador tem, de modo a garantir que um utilizador não possa colocar à venda, um artigo que não esteja na sua posse. Com isto é assumido que os artigos apenas podem ser transferidos nesta rede.</a:t>
+            </a:r>
+          </a:p>
+          <a:p>
+            <a:r>
+              <a:rPr lang="pt-PT" sz="2000" dirty="0"/>
+              <a:t>A aplicação a ser disponibilizada irá aceder à base de dados através de uma REST API que fará pedidos HTTP ao servidor de Base de Dados.</a:t>
+            </a:r>
+          </a:p>
+          <a:p>
+            <a:endParaRPr lang="pt-PT" sz="2000" dirty="0"/>
           </a:p>
         </p:txBody>
       </p:sp>
@@ -3497,6 +3529,1076 @@
     <p:extLst>
       <p:ext uri="{BB962C8B-B14F-4D97-AF65-F5344CB8AC3E}">
         <p14:creationId xmlns:p14="http://schemas.microsoft.com/office/powerpoint/2010/main" val="868187105"/>
+      </p:ext>
+    </p:extLst>
+  </p:cSld>
+  <p:clrMapOvr>
+    <a:masterClrMapping/>
+  </p:clrMapOvr>
+</p:sld>
+</file>
+
+<file path=ppt/slides/slide3.xml><?xml version="1.0" encoding="utf-8"?>
+<p:sld xmlns:a="http://schemas.openxmlformats.org/drawingml/2006/main" xmlns:r="http://schemas.openxmlformats.org/officeDocument/2006/relationships" xmlns:p="http://schemas.openxmlformats.org/presentationml/2006/main">
+  <p:cSld>
+    <p:spTree>
+      <p:nvGrpSpPr>
+        <p:cNvPr id="1" name=""/>
+        <p:cNvGrpSpPr/>
+        <p:nvPr/>
+      </p:nvGrpSpPr>
+      <p:grpSpPr>
+        <a:xfrm>
+          <a:off x="0" y="0"/>
+          <a:ext cx="0" cy="0"/>
+          <a:chOff x="0" y="0"/>
+          <a:chExt cx="0" cy="0"/>
+        </a:xfrm>
+      </p:grpSpPr>
+      <p:sp>
+        <p:nvSpPr>
+          <p:cNvPr id="2" name="Título 1">
+            <a:extLst>
+              <a:ext uri="{FF2B5EF4-FFF2-40B4-BE49-F238E27FC236}">
+                <a16:creationId xmlns:a16="http://schemas.microsoft.com/office/drawing/2014/main" id="{B8356D58-F384-4E00-A28A-632BC105775D}"/>
+              </a:ext>
+            </a:extLst>
+          </p:cNvPr>
+          <p:cNvSpPr>
+            <a:spLocks noGrp="1"/>
+          </p:cNvSpPr>
+          <p:nvPr>
+            <p:ph type="title"/>
+          </p:nvPr>
+        </p:nvSpPr>
+        <p:spPr/>
+        <p:txBody>
+          <a:bodyPr/>
+          <a:lstStyle/>
+          <a:p>
+            <a:r>
+              <a:rPr lang="pt-PT" dirty="0"/>
+              <a:t>Principais Operações</a:t>
+            </a:r>
+          </a:p>
+        </p:txBody>
+      </p:sp>
+      <p:sp>
+        <p:nvSpPr>
+          <p:cNvPr id="3" name="Marcador de Posição de Conteúdo 2">
+            <a:extLst>
+              <a:ext uri="{FF2B5EF4-FFF2-40B4-BE49-F238E27FC236}">
+                <a16:creationId xmlns:a16="http://schemas.microsoft.com/office/drawing/2014/main" id="{DB0C4B15-8AA5-4182-B939-072B70BF1A1F}"/>
+              </a:ext>
+            </a:extLst>
+          </p:cNvPr>
+          <p:cNvSpPr>
+            <a:spLocks noGrp="1"/>
+          </p:cNvSpPr>
+          <p:nvPr>
+            <p:ph idx="1"/>
+          </p:nvPr>
+        </p:nvSpPr>
+        <p:spPr/>
+        <p:txBody>
+          <a:bodyPr>
+            <a:normAutofit/>
+          </a:bodyPr>
+          <a:lstStyle/>
+          <a:p>
+            <a:r>
+              <a:rPr lang="pt-PT" sz="2000" dirty="0"/>
+              <a:t>Serão necessárias transações em todas as operações. Assim, o </a:t>
+            </a:r>
+            <a:r>
+              <a:rPr lang="pt-PT" sz="2000" i="1" dirty="0" err="1"/>
+              <a:t>autocommit</a:t>
+            </a:r>
+            <a:r>
+              <a:rPr lang="pt-PT" sz="2000" dirty="0"/>
+              <a:t> vai estar desligado.</a:t>
+            </a:r>
+          </a:p>
+          <a:p>
+            <a:r>
+              <a:rPr lang="pt-PT" sz="2000" dirty="0"/>
+              <a:t>Irá haver concorrência no pedido de licitações, sendo necessário controlo para garantir que uma transação não sobrescreva outra.</a:t>
+            </a:r>
+          </a:p>
+          <a:p>
+            <a:r>
+              <a:rPr lang="pt-PT" sz="2000" dirty="0"/>
+              <a:t>Para evitar concorrência, por exemplo nas pesquisas de leilões através da descrição (devido ao facto de esta poder estar a ser editada pelo vendedor), sempre que uma pesquisa for efetuada, será efetuada uma transação </a:t>
+            </a:r>
+            <a:r>
+              <a:rPr lang="pt-PT" sz="2000" i="1" dirty="0" err="1"/>
+              <a:t>Read</a:t>
+            </a:r>
+            <a:r>
+              <a:rPr lang="pt-PT" sz="2000" i="1" dirty="0"/>
+              <a:t> </a:t>
+            </a:r>
+            <a:r>
+              <a:rPr lang="pt-PT" sz="2000" i="1" dirty="0" err="1"/>
+              <a:t>Only</a:t>
+            </a:r>
+            <a:r>
+              <a:rPr lang="pt-PT" sz="2000" i="1" dirty="0"/>
+              <a:t>.</a:t>
+            </a:r>
+          </a:p>
+          <a:p>
+            <a:endParaRPr lang="pt-PT" sz="2000" i="1" dirty="0"/>
+          </a:p>
+        </p:txBody>
+      </p:sp>
+    </p:spTree>
+    <p:extLst>
+      <p:ext uri="{BB962C8B-B14F-4D97-AF65-F5344CB8AC3E}">
+        <p14:creationId xmlns:p14="http://schemas.microsoft.com/office/powerpoint/2010/main" val="785982951"/>
+      </p:ext>
+    </p:extLst>
+  </p:cSld>
+  <p:clrMapOvr>
+    <a:masterClrMapping/>
+  </p:clrMapOvr>
+</p:sld>
+</file>
+
+<file path=ppt/slides/slide4.xml><?xml version="1.0" encoding="utf-8"?>
+<p:sld xmlns:a="http://schemas.openxmlformats.org/drawingml/2006/main" xmlns:r="http://schemas.openxmlformats.org/officeDocument/2006/relationships" xmlns:p="http://schemas.openxmlformats.org/presentationml/2006/main">
+  <p:cSld>
+    <p:spTree>
+      <p:nvGrpSpPr>
+        <p:cNvPr id="1" name=""/>
+        <p:cNvGrpSpPr/>
+        <p:nvPr/>
+      </p:nvGrpSpPr>
+      <p:grpSpPr>
+        <a:xfrm>
+          <a:off x="0" y="0"/>
+          <a:ext cx="0" cy="0"/>
+          <a:chOff x="0" y="0"/>
+          <a:chExt cx="0" cy="0"/>
+        </a:xfrm>
+      </p:grpSpPr>
+      <p:sp>
+        <p:nvSpPr>
+          <p:cNvPr id="2" name="Título 1">
+            <a:extLst>
+              <a:ext uri="{FF2B5EF4-FFF2-40B4-BE49-F238E27FC236}">
+                <a16:creationId xmlns:a16="http://schemas.microsoft.com/office/drawing/2014/main" id="{044E90B2-B892-4D1A-AACA-D29B2E4ECDCD}"/>
+              </a:ext>
+            </a:extLst>
+          </p:cNvPr>
+          <p:cNvSpPr>
+            <a:spLocks noGrp="1"/>
+          </p:cNvSpPr>
+          <p:nvPr>
+            <p:ph type="title"/>
+          </p:nvPr>
+        </p:nvSpPr>
+        <p:spPr/>
+        <p:txBody>
+          <a:bodyPr/>
+          <a:lstStyle/>
+          <a:p>
+            <a:r>
+              <a:rPr lang="pt-PT" dirty="0"/>
+              <a:t>Tecnologias</a:t>
+            </a:r>
+          </a:p>
+        </p:txBody>
+      </p:sp>
+      <p:sp>
+        <p:nvSpPr>
+          <p:cNvPr id="3" name="Marcador de Posição de Conteúdo 2">
+            <a:extLst>
+              <a:ext uri="{FF2B5EF4-FFF2-40B4-BE49-F238E27FC236}">
+                <a16:creationId xmlns:a16="http://schemas.microsoft.com/office/drawing/2014/main" id="{B7256B2F-B29D-4F73-8FF8-2F7125D78199}"/>
+              </a:ext>
+            </a:extLst>
+          </p:cNvPr>
+          <p:cNvSpPr>
+            <a:spLocks noGrp="1"/>
+          </p:cNvSpPr>
+          <p:nvPr>
+            <p:ph idx="1"/>
+          </p:nvPr>
+        </p:nvSpPr>
+        <p:spPr/>
+        <p:txBody>
+          <a:bodyPr/>
+          <a:lstStyle/>
+          <a:p>
+            <a:r>
+              <a:rPr lang="pt-PT" sz="2400" dirty="0"/>
+              <a:t>A aplicação vai ser desenvolvida em </a:t>
+            </a:r>
+            <a:r>
+              <a:rPr lang="pt-PT" sz="2400" dirty="0" err="1"/>
+              <a:t>Python</a:t>
+            </a:r>
+            <a:r>
+              <a:rPr lang="pt-PT" sz="2400" dirty="0"/>
+              <a:t> 3, com recurso à biblioteca Psycopg2.</a:t>
+            </a:r>
+          </a:p>
+          <a:p>
+            <a:r>
+              <a:rPr lang="pt-PT" sz="2400" dirty="0"/>
+              <a:t>O cliente REST que vai ser utilizado será o </a:t>
+            </a:r>
+            <a:r>
+              <a:rPr lang="pt-PT" sz="2400" dirty="0" err="1"/>
+              <a:t>Postman</a:t>
+            </a:r>
+            <a:r>
+              <a:rPr lang="pt-PT" sz="2400" dirty="0"/>
+              <a:t>.</a:t>
+            </a:r>
+          </a:p>
+          <a:p>
+            <a:endParaRPr lang="pt-PT" dirty="0"/>
+          </a:p>
+        </p:txBody>
+      </p:sp>
+    </p:spTree>
+    <p:extLst>
+      <p:ext uri="{BB962C8B-B14F-4D97-AF65-F5344CB8AC3E}">
+        <p14:creationId xmlns:p14="http://schemas.microsoft.com/office/powerpoint/2010/main" val="3305162952"/>
+      </p:ext>
+    </p:extLst>
+  </p:cSld>
+  <p:clrMapOvr>
+    <a:masterClrMapping/>
+  </p:clrMapOvr>
+</p:sld>
+</file>
+
+<file path=ppt/slides/slide5.xml><?xml version="1.0" encoding="utf-8"?>
+<p:sld xmlns:a="http://schemas.openxmlformats.org/drawingml/2006/main" xmlns:r="http://schemas.openxmlformats.org/officeDocument/2006/relationships" xmlns:p="http://schemas.openxmlformats.org/presentationml/2006/main">
+  <p:cSld>
+    <p:spTree>
+      <p:nvGrpSpPr>
+        <p:cNvPr id="1" name=""/>
+        <p:cNvGrpSpPr/>
+        <p:nvPr/>
+      </p:nvGrpSpPr>
+      <p:grpSpPr>
+        <a:xfrm>
+          <a:off x="0" y="0"/>
+          <a:ext cx="0" cy="0"/>
+          <a:chOff x="0" y="0"/>
+          <a:chExt cx="0" cy="0"/>
+        </a:xfrm>
+      </p:grpSpPr>
+      <p:sp>
+        <p:nvSpPr>
+          <p:cNvPr id="2" name="Título 1">
+            <a:extLst>
+              <a:ext uri="{FF2B5EF4-FFF2-40B4-BE49-F238E27FC236}">
+                <a16:creationId xmlns:a16="http://schemas.microsoft.com/office/drawing/2014/main" id="{75610AA9-DA9B-484F-8A2C-243B454959EB}"/>
+              </a:ext>
+            </a:extLst>
+          </p:cNvPr>
+          <p:cNvSpPr>
+            <a:spLocks noGrp="1"/>
+          </p:cNvSpPr>
+          <p:nvPr>
+            <p:ph type="title"/>
+          </p:nvPr>
+        </p:nvSpPr>
+        <p:spPr/>
+        <p:txBody>
+          <a:bodyPr/>
+          <a:lstStyle/>
+          <a:p>
+            <a:r>
+              <a:rPr lang="pt-PT" dirty="0"/>
+              <a:t>Plano de Tarefas</a:t>
+            </a:r>
+          </a:p>
+        </p:txBody>
+      </p:sp>
+      <p:sp>
+        <p:nvSpPr>
+          <p:cNvPr id="3" name="Marcador de Posição de Conteúdo 2">
+            <a:extLst>
+              <a:ext uri="{FF2B5EF4-FFF2-40B4-BE49-F238E27FC236}">
+                <a16:creationId xmlns:a16="http://schemas.microsoft.com/office/drawing/2014/main" id="{14901219-AE54-44EB-90B4-E9AA66C41EF9}"/>
+              </a:ext>
+            </a:extLst>
+          </p:cNvPr>
+          <p:cNvSpPr>
+            <a:spLocks noGrp="1"/>
+          </p:cNvSpPr>
+          <p:nvPr>
+            <p:ph idx="1"/>
+          </p:nvPr>
+        </p:nvSpPr>
+        <p:spPr/>
+        <p:txBody>
+          <a:bodyPr/>
+          <a:lstStyle/>
+          <a:p>
+            <a:pPr marL="0" indent="0">
+              <a:buNone/>
+            </a:pPr>
+            <a:endParaRPr lang="pt-PT" dirty="0"/>
+          </a:p>
+        </p:txBody>
+      </p:sp>
+      <p:cxnSp>
+        <p:nvCxnSpPr>
+          <p:cNvPr id="5" name="Conexão reta unidirecional 4">
+            <a:extLst>
+              <a:ext uri="{FF2B5EF4-FFF2-40B4-BE49-F238E27FC236}">
+                <a16:creationId xmlns:a16="http://schemas.microsoft.com/office/drawing/2014/main" id="{257E9011-C366-42F9-A2B6-03C441EB28FC}"/>
+              </a:ext>
+              <a:ext uri="{C183D7F6-B498-43B3-948B-1728B52AA6E4}">
+                <adec:decorative xmlns:adec="http://schemas.microsoft.com/office/drawing/2017/decorative" val="0"/>
+              </a:ext>
+            </a:extLst>
+          </p:cNvPr>
+          <p:cNvCxnSpPr>
+            <a:cxnSpLocks/>
+          </p:cNvCxnSpPr>
+          <p:nvPr/>
+        </p:nvCxnSpPr>
+        <p:spPr>
+          <a:xfrm>
+            <a:off x="1693888" y="5292574"/>
+            <a:ext cx="7847677" cy="0"/>
+          </a:xfrm>
+          <a:prstGeom prst="straightConnector1">
+            <a:avLst/>
+          </a:prstGeom>
+          <a:ln>
+            <a:tailEnd type="triangle"/>
+          </a:ln>
+        </p:spPr>
+        <p:style>
+          <a:lnRef idx="3">
+            <a:schemeClr val="dk1"/>
+          </a:lnRef>
+          <a:fillRef idx="0">
+            <a:schemeClr val="dk1"/>
+          </a:fillRef>
+          <a:effectRef idx="2">
+            <a:schemeClr val="dk1"/>
+          </a:effectRef>
+          <a:fontRef idx="minor">
+            <a:schemeClr val="tx1"/>
+          </a:fontRef>
+        </p:style>
+      </p:cxnSp>
+      <p:sp>
+        <p:nvSpPr>
+          <p:cNvPr id="6" name="CaixaDeTexto 5">
+            <a:extLst>
+              <a:ext uri="{FF2B5EF4-FFF2-40B4-BE49-F238E27FC236}">
+                <a16:creationId xmlns:a16="http://schemas.microsoft.com/office/drawing/2014/main" id="{241A4D5D-96D2-4FC8-9E4D-283EABA24080}"/>
+              </a:ext>
+            </a:extLst>
+          </p:cNvPr>
+          <p:cNvSpPr txBox="1"/>
+          <p:nvPr/>
+        </p:nvSpPr>
+        <p:spPr>
+          <a:xfrm>
+            <a:off x="1693887" y="5427512"/>
+            <a:ext cx="7847677" cy="646331"/>
+          </a:xfrm>
+          <a:prstGeom prst="rect">
+            <a:avLst/>
+          </a:prstGeom>
+          <a:noFill/>
+        </p:spPr>
+        <p:txBody>
+          <a:bodyPr wrap="square" rtlCol="0">
+            <a:spAutoFit/>
+          </a:bodyPr>
+          <a:lstStyle/>
+          <a:p>
+            <a:r>
+              <a:rPr lang="pt-PT" dirty="0"/>
+              <a:t>	4			5			6	</a:t>
+            </a:r>
+          </a:p>
+          <a:p>
+            <a:r>
+              <a:rPr lang="pt-PT" dirty="0"/>
+              <a:t>		Mês</a:t>
+            </a:r>
+          </a:p>
+        </p:txBody>
+      </p:sp>
+      <p:cxnSp>
+        <p:nvCxnSpPr>
+          <p:cNvPr id="10" name="Conexão reta 9">
+            <a:extLst>
+              <a:ext uri="{FF2B5EF4-FFF2-40B4-BE49-F238E27FC236}">
+                <a16:creationId xmlns:a16="http://schemas.microsoft.com/office/drawing/2014/main" id="{5AE192C5-7BE6-47C1-A8A5-86A6EFC9A40E}"/>
+              </a:ext>
+            </a:extLst>
+          </p:cNvPr>
+          <p:cNvCxnSpPr/>
+          <p:nvPr/>
+        </p:nvCxnSpPr>
+        <p:spPr>
+          <a:xfrm>
+            <a:off x="4075040" y="5128591"/>
+            <a:ext cx="0" cy="298921"/>
+          </a:xfrm>
+          <a:prstGeom prst="line">
+            <a:avLst/>
+          </a:prstGeom>
+        </p:spPr>
+        <p:style>
+          <a:lnRef idx="1">
+            <a:schemeClr val="dk1"/>
+          </a:lnRef>
+          <a:fillRef idx="0">
+            <a:schemeClr val="dk1"/>
+          </a:fillRef>
+          <a:effectRef idx="0">
+            <a:schemeClr val="dk1"/>
+          </a:effectRef>
+          <a:fontRef idx="minor">
+            <a:schemeClr val="tx1"/>
+          </a:fontRef>
+        </p:style>
+      </p:cxnSp>
+      <p:sp>
+        <p:nvSpPr>
+          <p:cNvPr id="11" name="CaixaDeTexto 10">
+            <a:extLst>
+              <a:ext uri="{FF2B5EF4-FFF2-40B4-BE49-F238E27FC236}">
+                <a16:creationId xmlns:a16="http://schemas.microsoft.com/office/drawing/2014/main" id="{23066A2D-33AC-4883-A6A3-F5F16AA9E565}"/>
+              </a:ext>
+            </a:extLst>
+          </p:cNvPr>
+          <p:cNvSpPr txBox="1"/>
+          <p:nvPr/>
+        </p:nvSpPr>
+        <p:spPr>
+          <a:xfrm>
+            <a:off x="1693887" y="2623930"/>
+            <a:ext cx="2301643" cy="369332"/>
+          </a:xfrm>
+          <a:prstGeom prst="rect">
+            <a:avLst/>
+          </a:prstGeom>
+        </p:spPr>
+        <p:style>
+          <a:lnRef idx="2">
+            <a:schemeClr val="dk1"/>
+          </a:lnRef>
+          <a:fillRef idx="1">
+            <a:schemeClr val="lt1"/>
+          </a:fillRef>
+          <a:effectRef idx="0">
+            <a:schemeClr val="dk1"/>
+          </a:effectRef>
+          <a:fontRef idx="minor">
+            <a:schemeClr val="dk1"/>
+          </a:fontRef>
+        </p:style>
+        <p:txBody>
+          <a:bodyPr wrap="square" rtlCol="0">
+            <a:spAutoFit/>
+          </a:bodyPr>
+          <a:lstStyle/>
+          <a:p>
+            <a:r>
+              <a:rPr lang="pt-PT" dirty="0"/>
+              <a:t>Plano de projeto.</a:t>
+            </a:r>
+          </a:p>
+        </p:txBody>
+      </p:sp>
+      <p:sp>
+        <p:nvSpPr>
+          <p:cNvPr id="14" name="CaixaDeTexto 13">
+            <a:extLst>
+              <a:ext uri="{FF2B5EF4-FFF2-40B4-BE49-F238E27FC236}">
+                <a16:creationId xmlns:a16="http://schemas.microsoft.com/office/drawing/2014/main" id="{2F904622-60B2-4324-859C-9D4F8E361DBC}"/>
+              </a:ext>
+            </a:extLst>
+          </p:cNvPr>
+          <p:cNvSpPr txBox="1"/>
+          <p:nvPr/>
+        </p:nvSpPr>
+        <p:spPr>
+          <a:xfrm>
+            <a:off x="1693887" y="3429000"/>
+            <a:ext cx="2301643" cy="646331"/>
+          </a:xfrm>
+          <a:prstGeom prst="rect">
+            <a:avLst/>
+          </a:prstGeom>
+        </p:spPr>
+        <p:style>
+          <a:lnRef idx="2">
+            <a:schemeClr val="dk1"/>
+          </a:lnRef>
+          <a:fillRef idx="1">
+            <a:schemeClr val="lt1"/>
+          </a:fillRef>
+          <a:effectRef idx="0">
+            <a:schemeClr val="dk1"/>
+          </a:effectRef>
+          <a:fontRef idx="minor">
+            <a:schemeClr val="dk1"/>
+          </a:fontRef>
+        </p:style>
+        <p:txBody>
+          <a:bodyPr wrap="square" rtlCol="0">
+            <a:spAutoFit/>
+          </a:bodyPr>
+          <a:lstStyle/>
+          <a:p>
+            <a:r>
+              <a:rPr lang="pt-PT" dirty="0"/>
+              <a:t>Joel</a:t>
+            </a:r>
+          </a:p>
+          <a:p>
+            <a:r>
+              <a:rPr lang="pt-PT" dirty="0"/>
+              <a:t>João.</a:t>
+            </a:r>
+          </a:p>
+        </p:txBody>
+      </p:sp>
+      <p:cxnSp>
+        <p:nvCxnSpPr>
+          <p:cNvPr id="16" name="Conexão reta 15">
+            <a:extLst>
+              <a:ext uri="{FF2B5EF4-FFF2-40B4-BE49-F238E27FC236}">
+                <a16:creationId xmlns:a16="http://schemas.microsoft.com/office/drawing/2014/main" id="{8AFB356A-CF6E-4E87-8928-2437C72E0A5A}"/>
+              </a:ext>
+            </a:extLst>
+          </p:cNvPr>
+          <p:cNvCxnSpPr/>
+          <p:nvPr/>
+        </p:nvCxnSpPr>
+        <p:spPr>
+          <a:xfrm>
+            <a:off x="5486400" y="5128591"/>
+            <a:ext cx="0" cy="298921"/>
+          </a:xfrm>
+          <a:prstGeom prst="line">
+            <a:avLst/>
+          </a:prstGeom>
+        </p:spPr>
+        <p:style>
+          <a:lnRef idx="1">
+            <a:schemeClr val="dk1"/>
+          </a:lnRef>
+          <a:fillRef idx="0">
+            <a:schemeClr val="dk1"/>
+          </a:fillRef>
+          <a:effectRef idx="0">
+            <a:schemeClr val="dk1"/>
+          </a:effectRef>
+          <a:fontRef idx="minor">
+            <a:schemeClr val="tx1"/>
+          </a:fontRef>
+        </p:style>
+      </p:cxnSp>
+      <p:sp>
+        <p:nvSpPr>
+          <p:cNvPr id="17" name="CaixaDeTexto 16">
+            <a:extLst>
+              <a:ext uri="{FF2B5EF4-FFF2-40B4-BE49-F238E27FC236}">
+                <a16:creationId xmlns:a16="http://schemas.microsoft.com/office/drawing/2014/main" id="{67CEC30D-A940-492E-830F-8918B9AABB67}"/>
+              </a:ext>
+            </a:extLst>
+          </p:cNvPr>
+          <p:cNvSpPr txBox="1"/>
+          <p:nvPr/>
+        </p:nvSpPr>
+        <p:spPr>
+          <a:xfrm>
+            <a:off x="4075041" y="2623930"/>
+            <a:ext cx="1411358" cy="1200329"/>
+          </a:xfrm>
+          <a:prstGeom prst="rect">
+            <a:avLst/>
+          </a:prstGeom>
+        </p:spPr>
+        <p:style>
+          <a:lnRef idx="2">
+            <a:schemeClr val="dk1"/>
+          </a:lnRef>
+          <a:fillRef idx="1">
+            <a:schemeClr val="lt1"/>
+          </a:fillRef>
+          <a:effectRef idx="0">
+            <a:schemeClr val="dk1"/>
+          </a:effectRef>
+          <a:fontRef idx="minor">
+            <a:schemeClr val="dk1"/>
+          </a:fontRef>
+        </p:style>
+        <p:txBody>
+          <a:bodyPr wrap="square" rtlCol="0">
+            <a:spAutoFit/>
+          </a:bodyPr>
+          <a:lstStyle/>
+          <a:p>
+            <a:r>
+              <a:rPr lang="pt-PT" dirty="0"/>
+              <a:t>Registo</a:t>
+            </a:r>
+          </a:p>
+          <a:p>
+            <a:r>
+              <a:rPr lang="pt-PT" dirty="0"/>
+              <a:t>Autenticação</a:t>
+            </a:r>
+          </a:p>
+          <a:p>
+            <a:r>
+              <a:rPr lang="pt-PT" dirty="0"/>
+              <a:t>--</a:t>
+            </a:r>
+          </a:p>
+          <a:p>
+            <a:r>
+              <a:rPr lang="pt-PT" dirty="0"/>
+              <a:t>Joel</a:t>
+            </a:r>
+          </a:p>
+        </p:txBody>
+      </p:sp>
+      <p:sp>
+        <p:nvSpPr>
+          <p:cNvPr id="18" name="CaixaDeTexto 17">
+            <a:extLst>
+              <a:ext uri="{FF2B5EF4-FFF2-40B4-BE49-F238E27FC236}">
+                <a16:creationId xmlns:a16="http://schemas.microsoft.com/office/drawing/2014/main" id="{E80F6E95-83D0-4730-B86F-902FBD9D3DB9}"/>
+              </a:ext>
+            </a:extLst>
+          </p:cNvPr>
+          <p:cNvSpPr txBox="1"/>
+          <p:nvPr/>
+        </p:nvSpPr>
+        <p:spPr>
+          <a:xfrm>
+            <a:off x="4075040" y="3776870"/>
+            <a:ext cx="1411344" cy="1200329"/>
+          </a:xfrm>
+          <a:prstGeom prst="rect">
+            <a:avLst/>
+          </a:prstGeom>
+        </p:spPr>
+        <p:style>
+          <a:lnRef idx="2">
+            <a:schemeClr val="dk1"/>
+          </a:lnRef>
+          <a:fillRef idx="1">
+            <a:schemeClr val="lt1"/>
+          </a:fillRef>
+          <a:effectRef idx="0">
+            <a:schemeClr val="dk1"/>
+          </a:effectRef>
+          <a:fontRef idx="minor">
+            <a:schemeClr val="dk1"/>
+          </a:fontRef>
+        </p:style>
+        <p:txBody>
+          <a:bodyPr wrap="square" rtlCol="0">
+            <a:spAutoFit/>
+          </a:bodyPr>
+          <a:lstStyle/>
+          <a:p>
+            <a:r>
+              <a:rPr lang="pt-PT" dirty="0"/>
+              <a:t>Criação e Lista todos Leilões --</a:t>
+            </a:r>
+          </a:p>
+          <a:p>
+            <a:r>
+              <a:rPr lang="pt-PT" dirty="0"/>
+              <a:t>João</a:t>
+            </a:r>
+          </a:p>
+        </p:txBody>
+      </p:sp>
+      <p:sp>
+        <p:nvSpPr>
+          <p:cNvPr id="19" name="CaixaDeTexto 18">
+            <a:extLst>
+              <a:ext uri="{FF2B5EF4-FFF2-40B4-BE49-F238E27FC236}">
+                <a16:creationId xmlns:a16="http://schemas.microsoft.com/office/drawing/2014/main" id="{27CFF4DA-8D0A-4FD2-AE21-E51891CB7866}"/>
+              </a:ext>
+            </a:extLst>
+          </p:cNvPr>
+          <p:cNvSpPr txBox="1"/>
+          <p:nvPr/>
+        </p:nvSpPr>
+        <p:spPr>
+          <a:xfrm>
+            <a:off x="5486384" y="1975926"/>
+            <a:ext cx="1411312" cy="1477328"/>
+          </a:xfrm>
+          <a:prstGeom prst="rect">
+            <a:avLst/>
+          </a:prstGeom>
+        </p:spPr>
+        <p:style>
+          <a:lnRef idx="2">
+            <a:schemeClr val="dk1"/>
+          </a:lnRef>
+          <a:fillRef idx="1">
+            <a:schemeClr val="lt1"/>
+          </a:fillRef>
+          <a:effectRef idx="0">
+            <a:schemeClr val="dk1"/>
+          </a:effectRef>
+          <a:fontRef idx="minor">
+            <a:schemeClr val="dk1"/>
+          </a:fontRef>
+        </p:style>
+        <p:txBody>
+          <a:bodyPr wrap="square" rtlCol="0">
+            <a:spAutoFit/>
+          </a:bodyPr>
+          <a:lstStyle/>
+          <a:p>
+            <a:r>
+              <a:rPr lang="pt-PT" dirty="0"/>
+              <a:t>Pesquisa</a:t>
+            </a:r>
+          </a:p>
+          <a:p>
+            <a:r>
+              <a:rPr lang="pt-PT" dirty="0"/>
+              <a:t>Consulta</a:t>
+            </a:r>
+          </a:p>
+          <a:p>
+            <a:r>
+              <a:rPr lang="pt-PT" dirty="0"/>
+              <a:t>Lista leilão de </a:t>
+            </a:r>
+            <a:r>
+              <a:rPr lang="pt-PT" dirty="0" err="1"/>
+              <a:t>user</a:t>
+            </a:r>
+            <a:r>
+              <a:rPr lang="pt-PT" dirty="0"/>
+              <a:t> –</a:t>
+            </a:r>
+          </a:p>
+          <a:p>
+            <a:r>
+              <a:rPr lang="pt-PT" dirty="0"/>
+              <a:t>Joel</a:t>
+            </a:r>
+          </a:p>
+        </p:txBody>
+      </p:sp>
+      <p:sp>
+        <p:nvSpPr>
+          <p:cNvPr id="20" name="CaixaDeTexto 19">
+            <a:extLst>
+              <a:ext uri="{FF2B5EF4-FFF2-40B4-BE49-F238E27FC236}">
+                <a16:creationId xmlns:a16="http://schemas.microsoft.com/office/drawing/2014/main" id="{DB32B48E-17DA-4DA9-BEF6-73A36468E45D}"/>
+              </a:ext>
+            </a:extLst>
+          </p:cNvPr>
+          <p:cNvSpPr txBox="1"/>
+          <p:nvPr/>
+        </p:nvSpPr>
+        <p:spPr>
+          <a:xfrm>
+            <a:off x="5486359" y="3470267"/>
+            <a:ext cx="1411337" cy="1477328"/>
+          </a:xfrm>
+          <a:prstGeom prst="rect">
+            <a:avLst/>
+          </a:prstGeom>
+        </p:spPr>
+        <p:style>
+          <a:lnRef idx="2">
+            <a:schemeClr val="dk1"/>
+          </a:lnRef>
+          <a:fillRef idx="1">
+            <a:schemeClr val="lt1"/>
+          </a:fillRef>
+          <a:effectRef idx="0">
+            <a:schemeClr val="dk1"/>
+          </a:effectRef>
+          <a:fontRef idx="minor">
+            <a:schemeClr val="dk1"/>
+          </a:fontRef>
+        </p:style>
+        <p:txBody>
+          <a:bodyPr wrap="square" rtlCol="0">
+            <a:spAutoFit/>
+          </a:bodyPr>
+          <a:lstStyle/>
+          <a:p>
+            <a:r>
+              <a:rPr lang="pt-PT" dirty="0"/>
+              <a:t>Licitar</a:t>
+            </a:r>
+          </a:p>
+          <a:p>
+            <a:r>
+              <a:rPr lang="pt-PT" dirty="0"/>
+              <a:t>Editar Leilão</a:t>
+            </a:r>
+          </a:p>
+          <a:p>
+            <a:r>
+              <a:rPr lang="pt-PT" dirty="0"/>
+              <a:t>Mural </a:t>
+            </a:r>
+            <a:r>
+              <a:rPr lang="pt-PT" dirty="0" err="1"/>
+              <a:t>Msg</a:t>
+            </a:r>
+            <a:endParaRPr lang="pt-PT" dirty="0"/>
+          </a:p>
+          <a:p>
+            <a:r>
+              <a:rPr lang="pt-PT" dirty="0"/>
+              <a:t>--</a:t>
+            </a:r>
+          </a:p>
+          <a:p>
+            <a:r>
+              <a:rPr lang="pt-PT" dirty="0"/>
+              <a:t>João</a:t>
+            </a:r>
+          </a:p>
+        </p:txBody>
+      </p:sp>
+      <p:sp>
+        <p:nvSpPr>
+          <p:cNvPr id="21" name="CaixaDeTexto 20">
+            <a:extLst>
+              <a:ext uri="{FF2B5EF4-FFF2-40B4-BE49-F238E27FC236}">
+                <a16:creationId xmlns:a16="http://schemas.microsoft.com/office/drawing/2014/main" id="{EFA0DAF9-C3DE-48A0-8360-7D9CD781EAAF}"/>
+              </a:ext>
+            </a:extLst>
+          </p:cNvPr>
+          <p:cNvSpPr txBox="1"/>
+          <p:nvPr/>
+        </p:nvSpPr>
+        <p:spPr>
+          <a:xfrm>
+            <a:off x="6897696" y="1975926"/>
+            <a:ext cx="1411312" cy="1754326"/>
+          </a:xfrm>
+          <a:prstGeom prst="rect">
+            <a:avLst/>
+          </a:prstGeom>
+        </p:spPr>
+        <p:style>
+          <a:lnRef idx="2">
+            <a:schemeClr val="dk1"/>
+          </a:lnRef>
+          <a:fillRef idx="1">
+            <a:schemeClr val="lt1"/>
+          </a:fillRef>
+          <a:effectRef idx="0">
+            <a:schemeClr val="dk1"/>
+          </a:effectRef>
+          <a:fontRef idx="minor">
+            <a:schemeClr val="dk1"/>
+          </a:fontRef>
+        </p:style>
+        <p:txBody>
+          <a:bodyPr wrap="square" rtlCol="0">
+            <a:spAutoFit/>
+          </a:bodyPr>
+          <a:lstStyle/>
+          <a:p>
+            <a:r>
+              <a:rPr lang="pt-PT" dirty="0"/>
+              <a:t>Entrega de </a:t>
+            </a:r>
+            <a:r>
+              <a:rPr lang="pt-PT" dirty="0" err="1"/>
+              <a:t>Msg</a:t>
+            </a:r>
+            <a:endParaRPr lang="pt-PT" dirty="0"/>
+          </a:p>
+          <a:p>
+            <a:r>
+              <a:rPr lang="pt-PT" dirty="0"/>
+              <a:t>Notificar licitação ultrapassada</a:t>
+            </a:r>
+          </a:p>
+          <a:p>
+            <a:r>
+              <a:rPr lang="pt-PT" dirty="0"/>
+              <a:t>Joel</a:t>
+            </a:r>
+          </a:p>
+        </p:txBody>
+      </p:sp>
+      <p:sp>
+        <p:nvSpPr>
+          <p:cNvPr id="22" name="CaixaDeTexto 21">
+            <a:extLst>
+              <a:ext uri="{FF2B5EF4-FFF2-40B4-BE49-F238E27FC236}">
+                <a16:creationId xmlns:a16="http://schemas.microsoft.com/office/drawing/2014/main" id="{8E4FBB45-99DA-44E3-ABA1-97AFED774FF8}"/>
+              </a:ext>
+            </a:extLst>
+          </p:cNvPr>
+          <p:cNvSpPr txBox="1"/>
+          <p:nvPr/>
+        </p:nvSpPr>
+        <p:spPr>
+          <a:xfrm>
+            <a:off x="6897696" y="3699426"/>
+            <a:ext cx="1411312" cy="1477328"/>
+          </a:xfrm>
+          <a:prstGeom prst="rect">
+            <a:avLst/>
+          </a:prstGeom>
+        </p:spPr>
+        <p:style>
+          <a:lnRef idx="2">
+            <a:schemeClr val="dk1"/>
+          </a:lnRef>
+          <a:fillRef idx="1">
+            <a:schemeClr val="lt1"/>
+          </a:fillRef>
+          <a:effectRef idx="0">
+            <a:schemeClr val="dk1"/>
+          </a:effectRef>
+          <a:fontRef idx="minor">
+            <a:schemeClr val="dk1"/>
+          </a:fontRef>
+        </p:style>
+        <p:txBody>
+          <a:bodyPr wrap="square" rtlCol="0">
+            <a:spAutoFit/>
+          </a:bodyPr>
+          <a:lstStyle/>
+          <a:p>
+            <a:r>
+              <a:rPr lang="pt-PT" dirty="0"/>
+              <a:t>Preparar Documento Final de entrega –</a:t>
+            </a:r>
+          </a:p>
+          <a:p>
+            <a:r>
+              <a:rPr lang="pt-PT" dirty="0"/>
+              <a:t>João</a:t>
+            </a:r>
+          </a:p>
+        </p:txBody>
+      </p:sp>
+    </p:spTree>
+    <p:extLst>
+      <p:ext uri="{BB962C8B-B14F-4D97-AF65-F5344CB8AC3E}">
+        <p14:creationId xmlns:p14="http://schemas.microsoft.com/office/powerpoint/2010/main" val="2948568177"/>
+      </p:ext>
+    </p:extLst>
+  </p:cSld>
+  <p:clrMapOvr>
+    <a:masterClrMapping/>
+  </p:clrMapOvr>
+</p:sld>
+</file>
+
+<file path=ppt/slides/slide6.xml><?xml version="1.0" encoding="utf-8"?>
+<p:sld xmlns:a="http://schemas.openxmlformats.org/drawingml/2006/main" xmlns:r="http://schemas.openxmlformats.org/officeDocument/2006/relationships" xmlns:p="http://schemas.openxmlformats.org/presentationml/2006/main">
+  <p:cSld>
+    <p:spTree>
+      <p:nvGrpSpPr>
+        <p:cNvPr id="1" name=""/>
+        <p:cNvGrpSpPr/>
+        <p:nvPr/>
+      </p:nvGrpSpPr>
+      <p:grpSpPr>
+        <a:xfrm>
+          <a:off x="0" y="0"/>
+          <a:ext cx="0" cy="0"/>
+          <a:chOff x="0" y="0"/>
+          <a:chExt cx="0" cy="0"/>
+        </a:xfrm>
+      </p:grpSpPr>
+      <p:pic>
+        <p:nvPicPr>
+          <p:cNvPr id="5" name="Marcador de Posição de Conteúdo 4">
+            <a:extLst>
+              <a:ext uri="{FF2B5EF4-FFF2-40B4-BE49-F238E27FC236}">
+                <a16:creationId xmlns:a16="http://schemas.microsoft.com/office/drawing/2014/main" id="{B120606D-2988-4E8B-8A7D-F27FD822E99E}"/>
+              </a:ext>
+            </a:extLst>
+          </p:cNvPr>
+          <p:cNvPicPr>
+            <a:picLocks noGrp="1" noChangeAspect="1"/>
+          </p:cNvPicPr>
+          <p:nvPr>
+            <p:ph idx="1"/>
+          </p:nvPr>
+        </p:nvPicPr>
+        <p:blipFill>
+          <a:blip r:embed="rId2"/>
+          <a:stretch>
+            <a:fillRect/>
+          </a:stretch>
+        </p:blipFill>
+        <p:spPr>
+          <a:xfrm>
+            <a:off x="1060355" y="523081"/>
+            <a:ext cx="10293445" cy="5811838"/>
+          </a:xfrm>
+        </p:spPr>
+      </p:pic>
+      <p:sp>
+        <p:nvSpPr>
+          <p:cNvPr id="2" name="Título 1">
+            <a:extLst>
+              <a:ext uri="{FF2B5EF4-FFF2-40B4-BE49-F238E27FC236}">
+                <a16:creationId xmlns:a16="http://schemas.microsoft.com/office/drawing/2014/main" id="{7A1FA895-4261-470B-940A-E893412A65DC}"/>
+              </a:ext>
+            </a:extLst>
+          </p:cNvPr>
+          <p:cNvSpPr>
+            <a:spLocks noGrp="1"/>
+          </p:cNvSpPr>
+          <p:nvPr>
+            <p:ph type="title"/>
+          </p:nvPr>
+        </p:nvSpPr>
+        <p:spPr>
+          <a:xfrm>
+            <a:off x="616045" y="113493"/>
+            <a:ext cx="10515600" cy="1325563"/>
+          </a:xfrm>
+        </p:spPr>
+        <p:txBody>
+          <a:bodyPr/>
+          <a:lstStyle/>
+          <a:p>
+            <a:r>
+              <a:rPr lang="pt-PT" dirty="0"/>
+              <a:t>ER </a:t>
+            </a:r>
+            <a:r>
+              <a:rPr lang="pt-PT" dirty="0" err="1"/>
+              <a:t>Model</a:t>
+            </a:r>
+            <a:endParaRPr lang="pt-PT" dirty="0"/>
+          </a:p>
+        </p:txBody>
+      </p:sp>
+    </p:spTree>
+    <p:extLst>
+      <p:ext uri="{BB962C8B-B14F-4D97-AF65-F5344CB8AC3E}">
+        <p14:creationId xmlns:p14="http://schemas.microsoft.com/office/powerpoint/2010/main" val="1334731131"/>
       </p:ext>
     </p:extLst>
   </p:cSld>

</xml_diff>

<commit_message>
commit ppp com tabelas
</commit_message>
<xml_diff>
--- a/ApresentacaoProjetoBD.pptx
+++ b/ApresentacaoProjetoBD.pptx
@@ -11,6 +11,7 @@
     <p:sldId id="258" r:id="rId5"/>
     <p:sldId id="260" r:id="rId6"/>
     <p:sldId id="261" r:id="rId7"/>
+    <p:sldId id="262" r:id="rId8"/>
   </p:sldIdLst>
   <p:sldSz cx="12192000" cy="6858000"/>
   <p:notesSz cx="6858000" cy="9144000"/>
@@ -3404,7 +3405,15 @@
             <a:pPr algn="l"/>
             <a:r>
               <a:rPr lang="pt-PT" sz="1800" dirty="0"/>
-              <a:t>	João Cordeiro Veloso da Silva – Nº 2019xxxxxx – Email: uc2019xxxxxx@student.uc.pt</a:t>
+              <a:t>	João Cordeiro Veloso da Silva – Nº 2019217672 – Email</a:t>
+            </a:r>
+            <a:r>
+              <a:rPr lang="pt-PT" sz="1800"/>
+              <a:t>: uc2019217672</a:t>
+            </a:r>
+            <a:r>
+              <a:rPr lang="pt-PT" sz="1800" dirty="0"/>
+              <a:t>@student.uc.pt</a:t>
             </a:r>
           </a:p>
           <a:p>
@@ -4599,6 +4608,128 @@
     <p:extLst>
       <p:ext uri="{BB962C8B-B14F-4D97-AF65-F5344CB8AC3E}">
         <p14:creationId xmlns:p14="http://schemas.microsoft.com/office/powerpoint/2010/main" val="1334731131"/>
+      </p:ext>
+    </p:extLst>
+  </p:cSld>
+  <p:clrMapOvr>
+    <a:masterClrMapping/>
+  </p:clrMapOvr>
+</p:sld>
+</file>
+
+<file path=ppt/slides/slide7.xml><?xml version="1.0" encoding="utf-8"?>
+<p:sld xmlns:a="http://schemas.openxmlformats.org/drawingml/2006/main" xmlns:r="http://schemas.openxmlformats.org/officeDocument/2006/relationships" xmlns:p="http://schemas.openxmlformats.org/presentationml/2006/main">
+  <p:cSld>
+    <p:spTree>
+      <p:nvGrpSpPr>
+        <p:cNvPr id="1" name=""/>
+        <p:cNvGrpSpPr/>
+        <p:nvPr/>
+      </p:nvGrpSpPr>
+      <p:grpSpPr>
+        <a:xfrm>
+          <a:off x="0" y="0"/>
+          <a:ext cx="0" cy="0"/>
+          <a:chOff x="0" y="0"/>
+          <a:chExt cx="0" cy="0"/>
+        </a:xfrm>
+      </p:grpSpPr>
+      <p:sp>
+        <p:nvSpPr>
+          <p:cNvPr id="3" name="Marcador de Posição de Conteúdo 2">
+            <a:extLst>
+              <a:ext uri="{FF2B5EF4-FFF2-40B4-BE49-F238E27FC236}">
+                <a16:creationId xmlns:a16="http://schemas.microsoft.com/office/drawing/2014/main" id="{5AF5AD1A-F1AE-48DA-96C5-C3A1731B59FB}"/>
+              </a:ext>
+            </a:extLst>
+          </p:cNvPr>
+          <p:cNvSpPr>
+            <a:spLocks noGrp="1"/>
+          </p:cNvSpPr>
+          <p:nvPr>
+            <p:ph idx="1"/>
+          </p:nvPr>
+        </p:nvSpPr>
+        <p:spPr/>
+        <p:txBody>
+          <a:bodyPr/>
+          <a:lstStyle/>
+          <a:p>
+            <a:endParaRPr lang="pt-PT" dirty="0"/>
+          </a:p>
+        </p:txBody>
+      </p:sp>
+      <p:pic>
+        <p:nvPicPr>
+          <p:cNvPr id="5" name="Imagem 4">
+            <a:extLst>
+              <a:ext uri="{FF2B5EF4-FFF2-40B4-BE49-F238E27FC236}">
+                <a16:creationId xmlns:a16="http://schemas.microsoft.com/office/drawing/2014/main" id="{A7FEAE0D-EF27-4BEF-A2E5-59150589F3D5}"/>
+              </a:ext>
+            </a:extLst>
+          </p:cNvPr>
+          <p:cNvPicPr>
+            <a:picLocks noChangeAspect="1"/>
+          </p:cNvPicPr>
+          <p:nvPr/>
+        </p:nvPicPr>
+        <p:blipFill>
+          <a:blip r:embed="rId2"/>
+          <a:stretch>
+            <a:fillRect/>
+          </a:stretch>
+        </p:blipFill>
+        <p:spPr>
+          <a:xfrm>
+            <a:off x="275412" y="738526"/>
+            <a:ext cx="11641175" cy="6525536"/>
+          </a:xfrm>
+          <a:prstGeom prst="rect">
+            <a:avLst/>
+          </a:prstGeom>
+        </p:spPr>
+      </p:pic>
+      <p:sp>
+        <p:nvSpPr>
+          <p:cNvPr id="2" name="Título 1">
+            <a:extLst>
+              <a:ext uri="{FF2B5EF4-FFF2-40B4-BE49-F238E27FC236}">
+                <a16:creationId xmlns:a16="http://schemas.microsoft.com/office/drawing/2014/main" id="{41FCA21E-6195-486E-A9BD-747031E54B4E}"/>
+              </a:ext>
+            </a:extLst>
+          </p:cNvPr>
+          <p:cNvSpPr>
+            <a:spLocks noGrp="1"/>
+          </p:cNvSpPr>
+          <p:nvPr>
+            <p:ph type="title"/>
+          </p:nvPr>
+        </p:nvSpPr>
+        <p:spPr/>
+        <p:txBody>
+          <a:bodyPr/>
+          <a:lstStyle/>
+          <a:p>
+            <a:r>
+              <a:rPr lang="pt-PT" dirty="0" err="1"/>
+              <a:t>Relational</a:t>
+            </a:r>
+            <a:r>
+              <a:rPr lang="pt-PT" dirty="0"/>
+              <a:t> </a:t>
+            </a:r>
+            <a:r>
+              <a:rPr lang="pt-PT" dirty="0" err="1"/>
+              <a:t>Model</a:t>
+            </a:r>
+            <a:endParaRPr lang="pt-PT" dirty="0"/>
+          </a:p>
+        </p:txBody>
+      </p:sp>
+    </p:spTree>
+    <p:extLst>
+      <p:ext uri="{BB962C8B-B14F-4D97-AF65-F5344CB8AC3E}">
+        <p14:creationId xmlns:p14="http://schemas.microsoft.com/office/powerpoint/2010/main" val="3973410045"/>
       </p:ext>
     </p:extLst>
   </p:cSld>

</xml_diff>